<commit_message>
Update ppt sprint review
</commit_message>
<xml_diff>
--- a/Sprint 25 - Sprint review.pptx
+++ b/Sprint 25 - Sprint review.pptx
@@ -233,6 +233,10 @@
 </p:presentation>
 </file>
 
+<file path=ppt/revisionInfo.xml><?xml version="1.0" encoding="utf-8"?>
+<p1510:revInfo xmlns:a="http://schemas.openxmlformats.org/drawingml/2006/main" xmlns:r="http://schemas.openxmlformats.org/officeDocument/2006/relationships" xmlns:p1510="http://schemas.microsoft.com/office/powerpoint/2015/10/main"/>
+</file>
+
 <file path=ppt/notesMasters/notesMaster1.xml><?xml version="1.0" encoding="utf-8"?>
 <p:notesMaster xmlns:a="http://schemas.openxmlformats.org/drawingml/2006/main" xmlns:r="http://schemas.openxmlformats.org/officeDocument/2006/relationships" xmlns:p="http://schemas.openxmlformats.org/presentationml/2006/main">
   <p:cSld>
@@ -1188,7 +1192,7 @@
               </a:spcBef>
               <a:buNone/>
             </a:pPr>
-            <a:endParaRPr/>
+            <a:endParaRPr dirty="0"/>
           </a:p>
         </p:txBody>
       </p:sp>
@@ -1547,7 +1551,7 @@
               <a:buNone/>
             </a:pPr>
             <a:r>
-              <a:rPr lang="en-US" sz="1200" b="0" i="0" u="none" strike="noStrike" cap="none">
+              <a:rPr lang="en-US" sz="1200" b="0" i="0" u="none" strike="noStrike" cap="none" dirty="0">
                 <a:solidFill>
                   <a:schemeClr val="dk1"/>
                 </a:solidFill>
@@ -1686,7 +1690,7 @@
               </a:spcBef>
               <a:buNone/>
             </a:pPr>
-            <a:endParaRPr/>
+            <a:endParaRPr dirty="0"/>
           </a:p>
         </p:txBody>
       </p:sp>
@@ -2040,18 +2044,15 @@
               <a:buSzPct val="25000"/>
               <a:buNone/>
             </a:pPr>
-            <a:r>
-              <a:rPr lang="en-US" sz="1200" b="0" i="0" u="none" strike="noStrike" cap="none">
-                <a:solidFill>
-                  <a:schemeClr val="dk1"/>
-                </a:solidFill>
-                <a:latin typeface="Calibri"/>
-                <a:ea typeface="Calibri"/>
-                <a:cs typeface="Calibri"/>
-                <a:sym typeface="Calibri"/>
-              </a:rPr>
-              <a:t>5</a:t>
-            </a:r>
+            <a:endParaRPr lang="en-US" sz="1200" b="0" i="0" u="none" strike="noStrike" cap="none" dirty="0">
+              <a:solidFill>
+                <a:schemeClr val="dk1"/>
+              </a:solidFill>
+              <a:latin typeface="Calibri"/>
+              <a:ea typeface="Calibri"/>
+              <a:cs typeface="Calibri"/>
+              <a:sym typeface="Calibri"/>
+            </a:endParaRPr>
           </a:p>
         </p:txBody>
       </p:sp>
@@ -2237,7 +2238,7 @@
               <a:buNone/>
             </a:pPr>
             <a:r>
-              <a:rPr lang="en-US" sz="1200" b="0" i="0" u="none" strike="noStrike" cap="none">
+              <a:rPr lang="en-US" sz="1200" b="0" i="0" u="none" strike="noStrike" cap="none" dirty="0">
                 <a:solidFill>
                   <a:schemeClr val="dk1"/>
                 </a:solidFill>
@@ -2246,8 +2247,499 @@
                 <a:cs typeface="Calibri"/>
                 <a:sym typeface="Calibri"/>
               </a:rPr>
-              <a:t>5</a:t>
+              <a:t>The goals of the sprint are ….</a:t>
             </a:r>
+          </a:p>
+          <a:p>
+            <a:pPr marL="171450" marR="0" lvl="0" indent="-171450" algn="l" rtl="0">
+              <a:spcBef>
+                <a:spcPts val="0"/>
+              </a:spcBef>
+              <a:buSzPct val="25000"/>
+              <a:buFont typeface="Arial" panose="020B0604020202020204" pitchFamily="34" charset="0"/>
+              <a:buChar char="•"/>
+            </a:pPr>
+            <a:r>
+              <a:rPr lang="en-US" sz="1200" b="0" i="0" u="none" strike="noStrike" cap="none" dirty="0">
+                <a:solidFill>
+                  <a:schemeClr val="dk1"/>
+                </a:solidFill>
+                <a:latin typeface="Calibri"/>
+                <a:ea typeface="Calibri"/>
+                <a:cs typeface="Calibri"/>
+                <a:sym typeface="Calibri"/>
+              </a:rPr>
+              <a:t>Mongo DB</a:t>
+            </a:r>
+          </a:p>
+          <a:p>
+            <a:pPr marL="628650" marR="0" lvl="1" indent="-171450" algn="l" defTabSz="914400" rtl="0" eaLnBrk="1" fontAlgn="auto" latinLnBrk="0" hangingPunct="1">
+              <a:lnSpc>
+                <a:spcPct val="100000"/>
+              </a:lnSpc>
+              <a:spcBef>
+                <a:spcPts val="0"/>
+              </a:spcBef>
+              <a:spcAft>
+                <a:spcPts val="0"/>
+              </a:spcAft>
+              <a:buClrTx/>
+              <a:buSzPct val="25000"/>
+              <a:buFont typeface="Arial" panose="020B0604020202020204" pitchFamily="34" charset="0"/>
+              <a:buChar char="•"/>
+              <a:tabLst/>
+              <a:defRPr/>
+            </a:pPr>
+            <a:r>
+              <a:rPr lang="en-US" sz="1200" b="0" i="0" u="none" strike="noStrike" cap="none" dirty="0">
+                <a:solidFill>
+                  <a:schemeClr val="dk1"/>
+                </a:solidFill>
+                <a:latin typeface="Calibri"/>
+                <a:ea typeface="Calibri"/>
+                <a:cs typeface="Calibri"/>
+                <a:sym typeface="Calibri"/>
+              </a:rPr>
+              <a:t>We research information about Mongo DB that if we use it to store our data is it </a:t>
+            </a:r>
+            <a:r>
+              <a:rPr lang="en-US" sz="1200" b="1" i="0" u="none" strike="noStrike" kern="1200" cap="none" dirty="0">
+                <a:solidFill>
+                  <a:schemeClr val="dk1"/>
+                </a:solidFill>
+                <a:effectLst/>
+                <a:latin typeface="Calibri"/>
+                <a:ea typeface="Calibri"/>
+                <a:cs typeface="Calibri"/>
+                <a:sym typeface="Calibri"/>
+              </a:rPr>
+              <a:t>appropriate (</a:t>
+            </a:r>
+            <a:r>
+              <a:rPr lang="th-TH" sz="1200" b="0" i="0" u="none" strike="noStrike" kern="1200" cap="none" dirty="0">
+                <a:solidFill>
+                  <a:schemeClr val="dk1"/>
+                </a:solidFill>
+                <a:effectLst/>
+                <a:latin typeface="Calibri"/>
+                <a:ea typeface="Calibri"/>
+                <a:cs typeface="Calibri"/>
+                <a:sym typeface="Calibri"/>
+              </a:rPr>
+              <a:t>เออะ</a:t>
+            </a:r>
+            <a:r>
+              <a:rPr lang="en-US" sz="1200" b="0" i="0" u="none" strike="noStrike" kern="1200" cap="none" dirty="0">
+                <a:solidFill>
+                  <a:schemeClr val="dk1"/>
+                </a:solidFill>
+                <a:effectLst/>
+                <a:latin typeface="Calibri"/>
+                <a:ea typeface="Calibri"/>
+                <a:cs typeface="Calibri"/>
+                <a:sym typeface="Calibri"/>
+              </a:rPr>
+              <a:t>-</a:t>
+            </a:r>
+            <a:r>
+              <a:rPr lang="th-TH" sz="1200" b="0" i="0" u="none" strike="noStrike" kern="1200" cap="none" dirty="0">
+                <a:solidFill>
+                  <a:schemeClr val="dk1"/>
+                </a:solidFill>
+                <a:effectLst/>
+                <a:latin typeface="Calibri"/>
+                <a:ea typeface="Calibri"/>
+                <a:cs typeface="Calibri"/>
+                <a:sym typeface="Calibri"/>
+              </a:rPr>
+              <a:t>โพรฺเพรียท</a:t>
+            </a:r>
+            <a:r>
+              <a:rPr lang="en-US" sz="1200" b="1" i="0" u="none" strike="noStrike" kern="1200" cap="none" dirty="0">
+                <a:solidFill>
+                  <a:schemeClr val="dk1"/>
+                </a:solidFill>
+                <a:effectLst/>
+                <a:latin typeface="Calibri"/>
+                <a:ea typeface="Calibri"/>
+                <a:cs typeface="Calibri"/>
+                <a:sym typeface="Calibri"/>
+              </a:rPr>
+              <a:t>) </a:t>
+            </a:r>
+            <a:r>
+              <a:rPr lang="en-US" sz="1200" b="0" i="0" u="none" strike="noStrike" cap="none" dirty="0">
+                <a:solidFill>
+                  <a:schemeClr val="dk1"/>
+                </a:solidFill>
+                <a:latin typeface="Calibri"/>
+                <a:ea typeface="Calibri"/>
+                <a:cs typeface="Calibri"/>
+                <a:sym typeface="Calibri"/>
+              </a:rPr>
+              <a:t>or not</a:t>
+            </a:r>
+          </a:p>
+          <a:p>
+            <a:pPr marL="628650" marR="0" lvl="1" indent="-171450" algn="l" defTabSz="914400" rtl="0" eaLnBrk="1" fontAlgn="auto" latinLnBrk="0" hangingPunct="1">
+              <a:lnSpc>
+                <a:spcPct val="100000"/>
+              </a:lnSpc>
+              <a:spcBef>
+                <a:spcPts val="0"/>
+              </a:spcBef>
+              <a:spcAft>
+                <a:spcPts val="0"/>
+              </a:spcAft>
+              <a:buClrTx/>
+              <a:buSzPct val="25000"/>
+              <a:buFont typeface="Arial" panose="020B0604020202020204" pitchFamily="34" charset="0"/>
+              <a:buChar char="•"/>
+              <a:tabLst/>
+              <a:defRPr/>
+            </a:pPr>
+            <a:r>
+              <a:rPr lang="en-US" sz="1200" b="0" i="0" u="none" strike="noStrike" cap="none" dirty="0">
+                <a:solidFill>
+                  <a:schemeClr val="dk1"/>
+                </a:solidFill>
+                <a:latin typeface="Calibri"/>
+                <a:ea typeface="Calibri"/>
+                <a:cs typeface="Calibri"/>
+                <a:sym typeface="Calibri"/>
+              </a:rPr>
+              <a:t>what is the difference between HBase and MongoDB</a:t>
+            </a:r>
+            <a:endParaRPr lang="th-TH" sz="1200" b="0" i="0" u="none" strike="noStrike" cap="none" dirty="0">
+              <a:solidFill>
+                <a:schemeClr val="dk1"/>
+              </a:solidFill>
+              <a:latin typeface="Calibri"/>
+              <a:ea typeface="Calibri"/>
+              <a:cs typeface="Calibri"/>
+              <a:sym typeface="Calibri"/>
+            </a:endParaRPr>
+          </a:p>
+          <a:p>
+            <a:pPr marL="171450" marR="0" lvl="0" indent="-171450" algn="l" rtl="0">
+              <a:spcBef>
+                <a:spcPts val="0"/>
+              </a:spcBef>
+              <a:buSzPct val="25000"/>
+              <a:buFont typeface="Arial" panose="020B0604020202020204" pitchFamily="34" charset="0"/>
+              <a:buChar char="•"/>
+            </a:pPr>
+            <a:r>
+              <a:rPr lang="en-US" sz="1200" b="0" i="0" u="none" strike="noStrike" cap="none" dirty="0">
+                <a:solidFill>
+                  <a:schemeClr val="dk1"/>
+                </a:solidFill>
+                <a:latin typeface="Calibri"/>
+                <a:ea typeface="Calibri"/>
+                <a:cs typeface="Calibri"/>
+                <a:sym typeface="Calibri"/>
+              </a:rPr>
+              <a:t>Angular 4</a:t>
+            </a:r>
+          </a:p>
+          <a:p>
+            <a:pPr marL="628650" marR="0" lvl="1" indent="-171450" algn="l" rtl="0">
+              <a:spcBef>
+                <a:spcPts val="0"/>
+              </a:spcBef>
+              <a:buSzPct val="25000"/>
+              <a:buFont typeface="Arial" panose="020B0604020202020204" pitchFamily="34" charset="0"/>
+              <a:buChar char="•"/>
+            </a:pPr>
+            <a:r>
+              <a:rPr lang="en-US" sz="1200" b="0" i="0" u="none" strike="noStrike" cap="none" dirty="0">
+                <a:solidFill>
+                  <a:schemeClr val="dk1"/>
+                </a:solidFill>
+                <a:latin typeface="Calibri"/>
+                <a:ea typeface="Calibri"/>
+                <a:cs typeface="Calibri"/>
+                <a:sym typeface="Calibri"/>
+              </a:rPr>
+              <a:t>We have to know more information about angular 4 that if we use its </a:t>
+            </a:r>
+          </a:p>
+          <a:p>
+            <a:pPr marL="1085850" marR="0" lvl="2" indent="-171450" algn="l" rtl="0">
+              <a:spcBef>
+                <a:spcPts val="0"/>
+              </a:spcBef>
+              <a:buSzPct val="25000"/>
+              <a:buFont typeface="Arial" panose="020B0604020202020204" pitchFamily="34" charset="0"/>
+              <a:buChar char="•"/>
+            </a:pPr>
+            <a:r>
+              <a:rPr lang="en-US" sz="1200" b="0" i="0" u="none" strike="noStrike" cap="none" dirty="0">
+                <a:solidFill>
+                  <a:schemeClr val="dk1"/>
+                </a:solidFill>
+                <a:latin typeface="Calibri"/>
+                <a:ea typeface="Calibri"/>
+                <a:cs typeface="Calibri"/>
+                <a:sym typeface="Calibri"/>
+              </a:rPr>
+              <a:t>What are the effects on us, </a:t>
+            </a:r>
+          </a:p>
+          <a:p>
+            <a:pPr marL="1085850" marR="0" lvl="2" indent="-171450" algn="l" rtl="0">
+              <a:spcBef>
+                <a:spcPts val="0"/>
+              </a:spcBef>
+              <a:buSzPct val="25000"/>
+              <a:buFont typeface="Arial" panose="020B0604020202020204" pitchFamily="34" charset="0"/>
+              <a:buChar char="•"/>
+            </a:pPr>
+            <a:r>
+              <a:rPr lang="en-US" sz="1200" b="0" i="0" u="none" strike="noStrike" cap="none" dirty="0">
+                <a:solidFill>
+                  <a:schemeClr val="dk1"/>
+                </a:solidFill>
+                <a:latin typeface="Calibri"/>
+                <a:ea typeface="Calibri"/>
+                <a:cs typeface="Calibri"/>
+                <a:sym typeface="Calibri"/>
+              </a:rPr>
+              <a:t>What are the pros and cons of it ?</a:t>
+            </a:r>
+            <a:endParaRPr lang="th-TH" sz="1200" b="0" i="0" u="none" strike="noStrike" cap="none" dirty="0">
+              <a:solidFill>
+                <a:schemeClr val="dk1"/>
+              </a:solidFill>
+              <a:latin typeface="Calibri"/>
+              <a:ea typeface="Calibri"/>
+              <a:cs typeface="Calibri"/>
+              <a:sym typeface="Calibri"/>
+            </a:endParaRPr>
+          </a:p>
+          <a:p>
+            <a:pPr marL="1085850" marR="0" lvl="2" indent="-171450" algn="l" rtl="0">
+              <a:spcBef>
+                <a:spcPts val="0"/>
+              </a:spcBef>
+              <a:buSzPct val="25000"/>
+              <a:buFont typeface="Arial" panose="020B0604020202020204" pitchFamily="34" charset="0"/>
+              <a:buChar char="•"/>
+            </a:pPr>
+            <a:r>
+              <a:rPr lang="en-US" sz="1200" b="0" i="0" u="none" strike="noStrike" cap="none" dirty="0">
+                <a:solidFill>
+                  <a:schemeClr val="dk1"/>
+                </a:solidFill>
+                <a:latin typeface="Calibri"/>
+                <a:ea typeface="Calibri"/>
+                <a:cs typeface="Calibri"/>
+                <a:sym typeface="Calibri"/>
+              </a:rPr>
+              <a:t>What does it solve the problem of front-end for us ?</a:t>
+            </a:r>
+            <a:endParaRPr lang="th-TH" sz="1200" b="0" i="0" u="none" strike="noStrike" cap="none" dirty="0">
+              <a:solidFill>
+                <a:schemeClr val="dk1"/>
+              </a:solidFill>
+              <a:latin typeface="Calibri"/>
+              <a:ea typeface="Calibri"/>
+              <a:cs typeface="Calibri"/>
+              <a:sym typeface="Calibri"/>
+            </a:endParaRPr>
+          </a:p>
+          <a:p>
+            <a:pPr marL="171450" marR="0" lvl="0" indent="-171450" algn="l" rtl="0">
+              <a:spcBef>
+                <a:spcPts val="0"/>
+              </a:spcBef>
+              <a:buSzPct val="25000"/>
+              <a:buFont typeface="Arial" panose="020B0604020202020204" pitchFamily="34" charset="0"/>
+              <a:buChar char="•"/>
+            </a:pPr>
+            <a:r>
+              <a:rPr lang="en-US" sz="1200" b="0" i="0" u="none" strike="noStrike" cap="none" dirty="0">
+                <a:solidFill>
+                  <a:schemeClr val="dk1"/>
+                </a:solidFill>
+                <a:latin typeface="Calibri"/>
+                <a:ea typeface="Calibri"/>
+                <a:cs typeface="Calibri"/>
+                <a:sym typeface="Calibri"/>
+              </a:rPr>
+              <a:t>Product</a:t>
+            </a:r>
+          </a:p>
+          <a:p>
+            <a:pPr marL="628650" marR="0" lvl="1" indent="-171450" algn="l" rtl="0">
+              <a:spcBef>
+                <a:spcPts val="0"/>
+              </a:spcBef>
+              <a:buSzPct val="25000"/>
+              <a:buFont typeface="Arial" panose="020B0604020202020204" pitchFamily="34" charset="0"/>
+              <a:buChar char="•"/>
+            </a:pPr>
+            <a:r>
+              <a:rPr lang="en-US" sz="1200" b="0" i="0" u="none" strike="noStrike" cap="none" dirty="0">
+                <a:solidFill>
+                  <a:schemeClr val="dk1"/>
+                </a:solidFill>
+                <a:latin typeface="Calibri"/>
+                <a:ea typeface="Calibri"/>
+                <a:cs typeface="Calibri"/>
+                <a:sym typeface="Calibri"/>
+              </a:rPr>
+              <a:t>We created pages for manage data of product so now we can see, add and update data product on manage console</a:t>
+            </a:r>
+          </a:p>
+          <a:p>
+            <a:pPr marL="171450" marR="0" lvl="0" indent="-171450" algn="l" rtl="0">
+              <a:spcBef>
+                <a:spcPts val="0"/>
+              </a:spcBef>
+              <a:buSzPct val="25000"/>
+              <a:buFont typeface="Arial" panose="020B0604020202020204" pitchFamily="34" charset="0"/>
+              <a:buChar char="•"/>
+            </a:pPr>
+            <a:r>
+              <a:rPr lang="en-US" sz="1200" b="0" i="0" u="none" strike="noStrike" cap="none" dirty="0" err="1">
+                <a:solidFill>
+                  <a:schemeClr val="dk1"/>
+                </a:solidFill>
+                <a:latin typeface="Calibri"/>
+                <a:ea typeface="Calibri"/>
+                <a:cs typeface="Calibri"/>
+                <a:sym typeface="Calibri"/>
+              </a:rPr>
+              <a:t>Guid</a:t>
+            </a:r>
+            <a:r>
+              <a:rPr lang="en-US" sz="1200" b="0" i="0" u="none" strike="noStrike" cap="none" dirty="0">
+                <a:solidFill>
+                  <a:schemeClr val="dk1"/>
+                </a:solidFill>
+                <a:latin typeface="Calibri"/>
+                <a:ea typeface="Calibri"/>
+                <a:cs typeface="Calibri"/>
+                <a:sym typeface="Calibri"/>
+              </a:rPr>
+              <a:t> Provider</a:t>
+            </a:r>
+          </a:p>
+          <a:p>
+            <a:pPr marL="628650" marR="0" lvl="1" indent="-171450" algn="l" rtl="0">
+              <a:spcBef>
+                <a:spcPts val="0"/>
+              </a:spcBef>
+              <a:buSzPct val="25000"/>
+              <a:buFont typeface="Arial" panose="020B0604020202020204" pitchFamily="34" charset="0"/>
+              <a:buChar char="•"/>
+            </a:pPr>
+            <a:r>
+              <a:rPr lang="en-US" sz="1200" b="0" i="0" u="none" strike="noStrike" cap="none" dirty="0">
+                <a:solidFill>
+                  <a:schemeClr val="dk1"/>
+                </a:solidFill>
+                <a:latin typeface="Calibri"/>
+                <a:ea typeface="Calibri"/>
+                <a:cs typeface="Calibri"/>
+                <a:sym typeface="Calibri"/>
+              </a:rPr>
+              <a:t>We finished the GUID Provider system for generate global IDs </a:t>
+            </a:r>
+            <a:r>
+              <a:rPr lang="en-US" sz="1200" dirty="0"/>
+              <a:t>securely</a:t>
+            </a:r>
+            <a:r>
+              <a:rPr lang="en-US" sz="1200" b="0" i="0" u="none" strike="noStrike" cap="none" dirty="0">
+                <a:solidFill>
+                  <a:schemeClr val="dk1"/>
+                </a:solidFill>
+                <a:latin typeface="Calibri"/>
+                <a:ea typeface="Calibri"/>
+                <a:cs typeface="Calibri"/>
+                <a:sym typeface="Calibri"/>
+              </a:rPr>
+              <a:t>.</a:t>
+            </a:r>
+          </a:p>
+          <a:p>
+            <a:pPr marL="171450" marR="0" lvl="0" indent="-171450" algn="l" rtl="0">
+              <a:spcBef>
+                <a:spcPts val="0"/>
+              </a:spcBef>
+              <a:buSzPct val="25000"/>
+              <a:buFont typeface="Arial" panose="020B0604020202020204" pitchFamily="34" charset="0"/>
+              <a:buChar char="•"/>
+            </a:pPr>
+            <a:r>
+              <a:rPr lang="en-US" sz="1200" b="0" i="0" u="none" strike="noStrike" cap="none" dirty="0">
+                <a:solidFill>
+                  <a:schemeClr val="dk1"/>
+                </a:solidFill>
+                <a:latin typeface="Calibri"/>
+                <a:ea typeface="Calibri"/>
+                <a:cs typeface="Calibri"/>
+                <a:sym typeface="Calibri"/>
+              </a:rPr>
+              <a:t>Code coverage</a:t>
+            </a:r>
+          </a:p>
+          <a:p>
+            <a:pPr marL="628650" marR="0" lvl="1" indent="-171450" algn="l" rtl="0">
+              <a:spcBef>
+                <a:spcPts val="0"/>
+              </a:spcBef>
+              <a:buSzPct val="25000"/>
+              <a:buFont typeface="Arial" panose="020B0604020202020204" pitchFamily="34" charset="0"/>
+              <a:buChar char="•"/>
+            </a:pPr>
+            <a:r>
+              <a:rPr lang="en-US" sz="1200" b="0" i="0" u="none" strike="noStrike" cap="none" dirty="0">
+                <a:solidFill>
+                  <a:schemeClr val="dk1"/>
+                </a:solidFill>
+                <a:latin typeface="Calibri"/>
+                <a:ea typeface="Calibri"/>
+                <a:cs typeface="Calibri"/>
+                <a:sym typeface="Calibri"/>
+              </a:rPr>
+              <a:t>We research how to add the feature for check code coverage on </a:t>
+            </a:r>
+            <a:r>
+              <a:rPr lang="en-US" sz="1200" b="0" i="0" u="none" strike="noStrike" cap="none" dirty="0" err="1">
+                <a:solidFill>
+                  <a:schemeClr val="dk1"/>
+                </a:solidFill>
+                <a:latin typeface="Calibri"/>
+                <a:ea typeface="Calibri"/>
+                <a:cs typeface="Calibri"/>
+                <a:sym typeface="Calibri"/>
+              </a:rPr>
+              <a:t>sonarqube</a:t>
+            </a:r>
+            <a:r>
+              <a:rPr lang="en-US" sz="1200" b="0" i="0" u="none" strike="noStrike" cap="none" dirty="0">
+                <a:solidFill>
+                  <a:schemeClr val="dk1"/>
+                </a:solidFill>
+                <a:latin typeface="Calibri"/>
+                <a:ea typeface="Calibri"/>
+                <a:cs typeface="Calibri"/>
+                <a:sym typeface="Calibri"/>
+              </a:rPr>
+              <a:t>.</a:t>
+            </a:r>
+            <a:endParaRPr lang="th-TH" sz="1200" b="0" i="0" u="none" strike="noStrike" cap="none" dirty="0">
+              <a:solidFill>
+                <a:schemeClr val="dk1"/>
+              </a:solidFill>
+              <a:latin typeface="Calibri"/>
+              <a:ea typeface="Calibri"/>
+              <a:cs typeface="Calibri"/>
+              <a:sym typeface="Calibri"/>
+            </a:endParaRPr>
           </a:p>
         </p:txBody>
       </p:sp>
@@ -2433,7 +2925,7 @@
               <a:buNone/>
             </a:pPr>
             <a:r>
-              <a:rPr lang="en-US" sz="1200" b="0" i="0" u="none" strike="noStrike" cap="none">
+              <a:rPr lang="en-US" sz="1200" b="0" i="0" u="none" strike="noStrike" cap="none" dirty="0">
                 <a:solidFill>
                   <a:schemeClr val="dk1"/>
                 </a:solidFill>
@@ -2442,7 +2934,7 @@
                 <a:cs typeface="Calibri"/>
                 <a:sym typeface="Calibri"/>
               </a:rPr>
-              <a:t>5</a:t>
+              <a:t>These are user stories that we did</a:t>
             </a:r>
           </a:p>
         </p:txBody>
@@ -2630,7 +3122,7 @@
               <a:buChar char="-"/>
             </a:pPr>
             <a:r>
-              <a:rPr lang="th-TH" sz="1200" b="0" i="0" u="none" strike="noStrike" cap="none" baseline="0" dirty="0" smtClean="0">
+              <a:rPr lang="en-US" sz="1200" b="0" i="0" u="none" strike="noStrike" cap="none" baseline="0" dirty="0">
                 <a:solidFill>
                   <a:schemeClr val="dk1"/>
                 </a:solidFill>
@@ -2639,31 +3131,7 @@
                 <a:cs typeface="Calibri"/>
                 <a:sym typeface="Calibri"/>
               </a:rPr>
-              <a:t>เมื่อการทำงานช้าส่งผลให้ </a:t>
-            </a:r>
-            <a:r>
-              <a:rPr lang="en-US" sz="1200" b="0" i="0" u="none" strike="noStrike" cap="none" baseline="0" dirty="0" smtClean="0">
-                <a:solidFill>
-                  <a:schemeClr val="dk1"/>
-                </a:solidFill>
-                <a:latin typeface="Calibri"/>
-                <a:ea typeface="Calibri"/>
-                <a:cs typeface="Calibri"/>
-                <a:sym typeface="Calibri"/>
-              </a:rPr>
-              <a:t>Burn down chart </a:t>
-            </a:r>
-            <a:r>
-              <a:rPr lang="th-TH" sz="1200" b="0" i="0" u="none" strike="noStrike" cap="none" baseline="0" dirty="0" smtClean="0">
-                <a:solidFill>
-                  <a:schemeClr val="dk1"/>
-                </a:solidFill>
-                <a:latin typeface="Calibri"/>
-                <a:ea typeface="Calibri"/>
-                <a:cs typeface="Calibri"/>
-                <a:sym typeface="Calibri"/>
-              </a:rPr>
-              <a:t>ออกมาไม่ดีนัก</a:t>
+              <a:t>That make working slow and burn down chart was affected</a:t>
             </a:r>
             <a:endParaRPr lang="th-TH" sz="1200" b="0" i="0" u="none" strike="noStrike" cap="none" baseline="0" dirty="0">
               <a:solidFill>
@@ -2685,7 +3153,7 @@
               <a:buChar char="-"/>
             </a:pPr>
             <a:r>
-              <a:rPr lang="th-TH" sz="1200" b="0" i="0" u="none" strike="noStrike" cap="none" baseline="0" dirty="0" smtClean="0">
+              <a:rPr lang="th-TH" sz="1200" b="0" i="0" u="none" strike="noStrike" cap="none" baseline="0" dirty="0">
                 <a:solidFill>
                   <a:schemeClr val="dk1"/>
                 </a:solidFill>
@@ -2694,10 +3162,10 @@
                 <a:cs typeface="Calibri"/>
                 <a:sym typeface="Calibri"/>
               </a:rPr>
-              <a:t>เมื่อลืมนึกถึงเรื่องประสบกาณ์ เราทำงานจริงแล้ว ทำให้รู้ถึงปัญหาว่าเราประเมิณเวลาผิด เช่น บาง </a:t>
+              <a:t>เมื่อการทำงานช้าส่งผลให้ </a:t>
             </a:r>
             <a:r>
-              <a:rPr lang="en-US" sz="1200" b="0" i="0" u="none" strike="noStrike" cap="none" baseline="0" dirty="0" smtClean="0">
+              <a:rPr lang="en-US" sz="1200" b="0" i="0" u="none" strike="noStrike" cap="none" baseline="0" dirty="0">
                 <a:solidFill>
                   <a:schemeClr val="dk1"/>
                 </a:solidFill>
@@ -2706,10 +3174,10 @@
                 <a:cs typeface="Calibri"/>
                 <a:sym typeface="Calibri"/>
               </a:rPr>
-              <a:t>user story </a:t>
+              <a:t>Burn down chart </a:t>
             </a:r>
             <a:r>
-              <a:rPr lang="th-TH" sz="1200" b="0" i="0" u="none" strike="noStrike" cap="none" baseline="0" dirty="0" smtClean="0">
+              <a:rPr lang="th-TH" sz="1200" b="0" i="0" u="none" strike="noStrike" cap="none" baseline="0" dirty="0">
                 <a:solidFill>
                   <a:schemeClr val="dk1"/>
                 </a:solidFill>
@@ -2718,8 +3186,27 @@
                 <a:cs typeface="Calibri"/>
                 <a:sym typeface="Calibri"/>
               </a:rPr>
-              <a:t>ประเมิณไว้ 2 ชม แต่ทำจริง ๆ อาจจะใช้จริง ๆ 1 วัน</a:t>
+              <a:t>ออกมาไม่ดีนัก</a:t>
             </a:r>
+          </a:p>
+          <a:p>
+            <a:pPr marL="171450" marR="0" lvl="0" indent="-171450" algn="l" rtl="0">
+              <a:spcBef>
+                <a:spcPts val="0"/>
+              </a:spcBef>
+              <a:buSzPct val="25000"/>
+              <a:buFontTx/>
+              <a:buChar char="-"/>
+            </a:pPr>
+            <a:endParaRPr lang="th-TH" sz="1200" b="0" i="0" u="none" strike="noStrike" cap="none" baseline="0" dirty="0">
+              <a:solidFill>
+                <a:schemeClr val="dk1"/>
+              </a:solidFill>
+              <a:latin typeface="Calibri"/>
+              <a:ea typeface="Calibri"/>
+              <a:cs typeface="Calibri"/>
+              <a:sym typeface="Calibri"/>
+            </a:endParaRPr>
           </a:p>
           <a:p>
             <a:pPr marL="171450" marR="0" lvl="0" indent="-171450" algn="l" rtl="0">
@@ -2731,7 +3218,134 @@
               <a:buChar char="-"/>
             </a:pPr>
             <a:r>
-              <a:rPr lang="th-TH" sz="1200" b="0" i="0" u="none" strike="noStrike" cap="none" baseline="0" dirty="0" smtClean="0">
+              <a:rPr lang="en-US" sz="1200" b="0" i="0" u="none" strike="noStrike" cap="none" baseline="0" dirty="0">
+                <a:solidFill>
+                  <a:schemeClr val="dk1"/>
+                </a:solidFill>
+                <a:latin typeface="Calibri"/>
+                <a:ea typeface="Calibri"/>
+                <a:cs typeface="Calibri"/>
+                <a:sym typeface="Calibri"/>
+              </a:rPr>
+              <a:t>Some user stories took more time</a:t>
+            </a:r>
+            <a:endParaRPr lang="th-TH" sz="1200" b="0" i="0" u="none" strike="noStrike" cap="none" baseline="0" dirty="0">
+              <a:solidFill>
+                <a:schemeClr val="dk1"/>
+              </a:solidFill>
+              <a:latin typeface="Calibri"/>
+              <a:ea typeface="Calibri"/>
+              <a:cs typeface="Calibri"/>
+              <a:sym typeface="Calibri"/>
+            </a:endParaRPr>
+          </a:p>
+          <a:p>
+            <a:pPr marL="171450" marR="0" lvl="0" indent="-171450" algn="l" rtl="0">
+              <a:spcBef>
+                <a:spcPts val="0"/>
+              </a:spcBef>
+              <a:buSzPct val="25000"/>
+              <a:buFontTx/>
+              <a:buChar char="-"/>
+            </a:pPr>
+            <a:r>
+              <a:rPr lang="th-TH" sz="1200" b="0" i="0" u="none" strike="noStrike" cap="none" baseline="0" dirty="0">
+                <a:solidFill>
+                  <a:schemeClr val="dk1"/>
+                </a:solidFill>
+                <a:latin typeface="Calibri"/>
+                <a:ea typeface="Calibri"/>
+                <a:cs typeface="Calibri"/>
+                <a:sym typeface="Calibri"/>
+              </a:rPr>
+              <a:t>ทำให้รู้ถึงปัญหาว่าเราประเมิณเวลาผิด เช่น บาง </a:t>
+            </a:r>
+            <a:r>
+              <a:rPr lang="en-US" sz="1200" b="0" i="0" u="none" strike="noStrike" cap="none" baseline="0" dirty="0">
+                <a:solidFill>
+                  <a:schemeClr val="dk1"/>
+                </a:solidFill>
+                <a:latin typeface="Calibri"/>
+                <a:ea typeface="Calibri"/>
+                <a:cs typeface="Calibri"/>
+                <a:sym typeface="Calibri"/>
+              </a:rPr>
+              <a:t>user story </a:t>
+            </a:r>
+            <a:r>
+              <a:rPr lang="th-TH" sz="1200" b="0" i="0" u="none" strike="noStrike" cap="none" baseline="0" dirty="0">
+                <a:solidFill>
+                  <a:schemeClr val="dk1"/>
+                </a:solidFill>
+                <a:latin typeface="Calibri"/>
+                <a:ea typeface="Calibri"/>
+                <a:cs typeface="Calibri"/>
+                <a:sym typeface="Calibri"/>
+              </a:rPr>
+              <a:t>ประเมิณไว้ 2 ชม แต่ทำจริง ๆ อาจจะใช้จริง ๆ 1 วัน </a:t>
+            </a:r>
+          </a:p>
+          <a:p>
+            <a:pPr marL="171450" marR="0" lvl="0" indent="-171450" algn="l" rtl="0">
+              <a:spcBef>
+                <a:spcPts val="0"/>
+              </a:spcBef>
+              <a:buSzPct val="25000"/>
+              <a:buFontTx/>
+              <a:buChar char="-"/>
+            </a:pPr>
+            <a:endParaRPr lang="th-TH" sz="1200" b="0" i="0" u="none" strike="noStrike" cap="none" baseline="0" dirty="0">
+              <a:solidFill>
+                <a:schemeClr val="dk1"/>
+              </a:solidFill>
+              <a:latin typeface="Calibri"/>
+              <a:ea typeface="Calibri"/>
+              <a:cs typeface="Calibri"/>
+              <a:sym typeface="Calibri"/>
+            </a:endParaRPr>
+          </a:p>
+          <a:p>
+            <a:pPr marL="171450" marR="0" lvl="0" indent="-171450" algn="l" rtl="0">
+              <a:spcBef>
+                <a:spcPts val="0"/>
+              </a:spcBef>
+              <a:buSzPct val="25000"/>
+              <a:buFontTx/>
+              <a:buChar char="-"/>
+            </a:pPr>
+            <a:r>
+              <a:rPr lang="en-US" sz="1200" b="0" i="0" u="none" strike="noStrike" cap="none" baseline="0" dirty="0">
+                <a:solidFill>
+                  <a:schemeClr val="dk1"/>
+                </a:solidFill>
+                <a:latin typeface="Calibri"/>
+                <a:ea typeface="Calibri"/>
+                <a:cs typeface="Calibri"/>
+                <a:sym typeface="Calibri"/>
+              </a:rPr>
+              <a:t>So waste times merging code.</a:t>
+            </a:r>
+            <a:endParaRPr lang="th-TH" sz="1200" b="0" i="0" u="none" strike="noStrike" cap="none" baseline="0" dirty="0">
+              <a:solidFill>
+                <a:schemeClr val="dk1"/>
+              </a:solidFill>
+              <a:latin typeface="Calibri"/>
+              <a:ea typeface="Calibri"/>
+              <a:cs typeface="Calibri"/>
+              <a:sym typeface="Calibri"/>
+            </a:endParaRPr>
+          </a:p>
+          <a:p>
+            <a:pPr marL="171450" marR="0" lvl="0" indent="-171450" algn="l" rtl="0">
+              <a:spcBef>
+                <a:spcPts val="0"/>
+              </a:spcBef>
+              <a:buSzPct val="25000"/>
+              <a:buFontTx/>
+              <a:buChar char="-"/>
+            </a:pPr>
+            <a:r>
+              <a:rPr lang="th-TH" sz="1200" b="0" i="0" u="none" strike="noStrike" cap="none" baseline="0" dirty="0">
                 <a:solidFill>
                   <a:schemeClr val="dk1"/>
                 </a:solidFill>
@@ -2743,7 +3357,7 @@
               <a:t>เสียเวลาการ </a:t>
             </a:r>
             <a:r>
-              <a:rPr lang="en-US" sz="1200" b="0" i="0" u="none" strike="noStrike" cap="none" baseline="0" smtClean="0">
+              <a:rPr lang="en-US" sz="1200" b="0" i="0" u="none" strike="noStrike" cap="none" baseline="0" dirty="0">
                 <a:solidFill>
                   <a:schemeClr val="dk1"/>
                 </a:solidFill>
@@ -2753,6 +3367,94 @@
                 <a:sym typeface="Calibri"/>
               </a:rPr>
               <a:t>merge code</a:t>
+            </a:r>
+          </a:p>
+          <a:p>
+            <a:pPr marL="171450" marR="0" lvl="0" indent="-171450" algn="l" rtl="0">
+              <a:spcBef>
+                <a:spcPts val="0"/>
+              </a:spcBef>
+              <a:buSzPct val="25000"/>
+              <a:buFontTx/>
+              <a:buChar char="-"/>
+            </a:pPr>
+            <a:endParaRPr lang="en-US" sz="1200" b="0" i="0" u="none" strike="noStrike" cap="none" baseline="0" dirty="0">
+              <a:solidFill>
+                <a:schemeClr val="dk1"/>
+              </a:solidFill>
+              <a:latin typeface="Calibri"/>
+              <a:ea typeface="Calibri"/>
+              <a:cs typeface="Calibri"/>
+              <a:sym typeface="Calibri"/>
+            </a:endParaRPr>
+          </a:p>
+          <a:p>
+            <a:pPr marL="171450" marR="0" lvl="0" indent="-171450" algn="l" rtl="0">
+              <a:spcBef>
+                <a:spcPts val="0"/>
+              </a:spcBef>
+              <a:buSzPct val="25000"/>
+              <a:buFontTx/>
+              <a:buChar char="-"/>
+            </a:pPr>
+            <a:r>
+              <a:rPr lang="en-US" sz="1200" b="0" i="0" u="none" strike="noStrike" cap="none" baseline="0" dirty="0">
+                <a:solidFill>
+                  <a:schemeClr val="dk1"/>
+                </a:solidFill>
+                <a:latin typeface="Calibri"/>
+                <a:ea typeface="Calibri"/>
+                <a:cs typeface="Calibri"/>
+                <a:sym typeface="Calibri"/>
+              </a:rPr>
+              <a:t>I will demonstrate (</a:t>
+            </a:r>
+            <a:r>
+              <a:rPr lang="th-TH" sz="1200" b="0" i="0" u="none" strike="noStrike" kern="1200" cap="none" dirty="0">
+                <a:solidFill>
+                  <a:schemeClr val="dk1"/>
+                </a:solidFill>
+                <a:effectLst/>
+                <a:latin typeface="Calibri"/>
+                <a:ea typeface="Calibri"/>
+                <a:cs typeface="Calibri"/>
+                <a:sym typeface="Calibri"/>
+              </a:rPr>
+              <a:t>เด็มเมินซเตรฺท</a:t>
+            </a:r>
+            <a:r>
+              <a:rPr lang="en-US" sz="1200" b="0" i="0" u="none" strike="noStrike" cap="none" baseline="0" dirty="0">
+                <a:solidFill>
+                  <a:schemeClr val="dk1"/>
+                </a:solidFill>
+                <a:latin typeface="Calibri"/>
+                <a:ea typeface="Calibri"/>
+                <a:cs typeface="Calibri"/>
+                <a:sym typeface="Calibri"/>
+              </a:rPr>
+              <a:t>) how to adding and editing products.</a:t>
+            </a:r>
+          </a:p>
+          <a:p>
+            <a:pPr marL="171450" marR="0" lvl="0" indent="-171450" algn="l" rtl="0">
+              <a:spcBef>
+                <a:spcPts val="0"/>
+              </a:spcBef>
+              <a:buSzPct val="25000"/>
+              <a:buFontTx/>
+              <a:buChar char="-"/>
+            </a:pPr>
+            <a:r>
+              <a:rPr lang="en-US" sz="1200" b="0" i="0" u="none" strike="noStrike" cap="none" baseline="0" dirty="0">
+                <a:solidFill>
+                  <a:schemeClr val="dk1"/>
+                </a:solidFill>
+                <a:latin typeface="Calibri"/>
+                <a:ea typeface="Calibri"/>
+                <a:cs typeface="Calibri"/>
+                <a:sym typeface="Calibri"/>
+              </a:rPr>
+              <a:t>After that I will show how to searching data products</a:t>
             </a:r>
             <a:endParaRPr lang="th-TH" sz="1200" b="0" i="0" u="none" strike="noStrike" cap="none" baseline="0" dirty="0">
               <a:solidFill>
@@ -13962,18 +14664,6 @@
               </a:rPr>
               <a:t>Sprint review</a:t>
             </a:r>
-            <a:r>
-              <a:rPr lang="en-US" sz="4400" b="1" i="0" u="none" strike="noStrike" cap="none" dirty="0">
-                <a:solidFill>
-                  <a:schemeClr val="dk1"/>
-                </a:solidFill>
-                <a:latin typeface="Calibri"/>
-                <a:ea typeface="Calibri"/>
-                <a:cs typeface="Calibri"/>
-                <a:sym typeface="Calibri"/>
-              </a:rPr>
-              <a:t/>
-            </a:r>
             <a:br>
               <a:rPr lang="en-US" sz="4400" b="1" i="0" u="none" strike="noStrike" cap="none" dirty="0">
                 <a:solidFill>
@@ -13995,22 +14685,10 @@
                 <a:cs typeface="Calibri"/>
                 <a:sym typeface="Calibri"/>
               </a:rPr>
-              <a:t>Sprint: </a:t>
+              <a:t>Sprint: 2</a:t>
             </a:r>
             <a:r>
-              <a:rPr lang="en-US" sz="4000" b="1" i="0" u="none" strike="noStrike" cap="none" dirty="0" smtClean="0">
-                <a:solidFill>
-                  <a:schemeClr val="dk1"/>
-                </a:solidFill>
-                <a:latin typeface="Calibri"/>
-                <a:ea typeface="Calibri"/>
-                <a:cs typeface="Calibri"/>
-                <a:sym typeface="Calibri"/>
-              </a:rPr>
-              <a:t>2</a:t>
-            </a:r>
-            <a:r>
-              <a:rPr lang="th-TH" sz="4000" b="1" i="0" u="none" strike="noStrike" cap="none" dirty="0" smtClean="0">
+              <a:rPr lang="th-TH" sz="4000" b="1" i="0" u="none" strike="noStrike" cap="none" dirty="0">
                 <a:solidFill>
                   <a:schemeClr val="dk1"/>
                 </a:solidFill>
@@ -14022,7 +14700,7 @@
               <a:t>5</a:t>
             </a:r>
             <a:r>
-              <a:rPr lang="en-US" sz="4000" b="1" i="0" u="none" strike="noStrike" cap="none" dirty="0" smtClean="0">
+              <a:rPr lang="en-US" sz="4000" b="1" i="0" u="none" strike="noStrike" cap="none" dirty="0">
                 <a:solidFill>
                   <a:schemeClr val="dk1"/>
                 </a:solidFill>
@@ -14031,19 +14709,7 @@
                 <a:cs typeface="Calibri"/>
                 <a:sym typeface="Calibri"/>
               </a:rPr>
-              <a:t> </a:t>
-            </a:r>
-            <a:r>
-              <a:rPr lang="en-US" sz="4000" b="1" i="0" u="none" strike="noStrike" cap="none" dirty="0">
-                <a:solidFill>
-                  <a:schemeClr val="dk1"/>
-                </a:solidFill>
-                <a:latin typeface="Calibri"/>
-                <a:ea typeface="Calibri"/>
-                <a:cs typeface="Calibri"/>
-                <a:sym typeface="Calibri"/>
-              </a:rPr>
-              <a:t>– Team: </a:t>
+              <a:t> – Team: </a:t>
             </a:r>
             <a:r>
               <a:rPr lang="en-US" sz="4000" b="1" dirty="0" err="1"/>
@@ -14100,7 +14766,7 @@
               <a:buNone/>
             </a:pPr>
             <a:r>
-              <a:rPr lang="en-US" sz="2800" b="0" i="0" u="none" strike="noStrike" cap="none">
+              <a:rPr lang="en-US" sz="2800" b="0" i="0" u="none" strike="noStrike" cap="none" dirty="0">
                 <a:solidFill>
                   <a:srgbClr val="FF0000"/>
                 </a:solidFill>
@@ -14372,13 +15038,6 @@
   <p:transition spd="med">
     <p:fade/>
   </p:transition>
-  <p:timing>
-    <p:tnLst>
-      <p:par>
-        <p:cTn id="1" dur="indefinite" restart="never" nodeType="tmRoot"/>
-      </p:par>
-    </p:tnLst>
-  </p:timing>
 </p:sld>
 </file>
 
@@ -14626,7 +15285,7 @@
               <a:buChar char="•"/>
             </a:pPr>
             <a:r>
-              <a:rPr lang="en-US" sz="1800" u="sng" dirty="0" smtClean="0">
+              <a:rPr lang="en-US" sz="1800" u="sng" dirty="0">
                 <a:solidFill>
                   <a:schemeClr val="hlink"/>
                 </a:solidFill>
@@ -14637,7 +15296,7 @@
               </a:rPr>
               <a:t>Product</a:t>
             </a:r>
-            <a:endParaRPr lang="en-US" sz="1800" u="sng" dirty="0" smtClean="0">
+            <a:endParaRPr lang="en-US" sz="1800" u="sng" dirty="0">
               <a:solidFill>
                 <a:schemeClr val="hlink"/>
               </a:solidFill>
@@ -14659,7 +15318,7 @@
               <a:buChar char="•"/>
             </a:pPr>
             <a:r>
-              <a:rPr lang="en-US" sz="1800" u="sng" dirty="0" smtClean="0">
+              <a:rPr lang="en-US" sz="1800" u="sng" dirty="0">
                 <a:solidFill>
                   <a:schemeClr val="hlink"/>
                 </a:solidFill>
@@ -14755,13 +15414,6 @@
   <p:transition spd="med">
     <p:fade/>
   </p:transition>
-  <p:timing>
-    <p:tnLst>
-      <p:par>
-        <p:cTn id="1" dur="indefinite" restart="never" nodeType="tmRoot"/>
-      </p:par>
-    </p:tnLst>
-  </p:timing>
 </p:sld>
 </file>
 
@@ -14872,13 +15524,6 @@
   <p:clrMapOvr>
     <a:masterClrMapping/>
   </p:clrMapOvr>
-  <p:timing>
-    <p:tnLst>
-      <p:par>
-        <p:cTn id="1" dur="indefinite" restart="never" nodeType="tmRoot"/>
-      </p:par>
-    </p:tnLst>
-  </p:timing>
 </p:sld>
 </file>
 
@@ -15360,13 +16005,6 @@
   <p:transition spd="med">
     <p:fade/>
   </p:transition>
-  <p:timing>
-    <p:tnLst>
-      <p:par>
-        <p:cTn id="1" dur="indefinite" restart="never" nodeType="tmRoot"/>
-      </p:par>
-    </p:tnLst>
-  </p:timing>
 </p:sld>
 </file>
 
@@ -15637,7 +16275,7 @@
               <a:buNone/>
             </a:pPr>
             <a:r>
-              <a:rPr lang="en-US" sz="2220" dirty="0" smtClean="0">
+              <a:rPr lang="en-US" sz="2220" dirty="0">
                 <a:solidFill>
                   <a:schemeClr val="dk1"/>
                 </a:solidFill>
@@ -15828,7 +16466,7 @@
               <a:buAutoNum type="arabicPeriod"/>
             </a:pPr>
             <a:r>
-              <a:rPr lang="en-US" sz="2220" b="0" i="0" u="none" strike="noStrike" cap="none" dirty="0" err="1" smtClean="0">
+              <a:rPr lang="en-US" sz="2220" b="0" i="0" u="none" strike="noStrike" cap="none" dirty="0" err="1">
                 <a:solidFill>
                   <a:schemeClr val="dk1"/>
                 </a:solidFill>
@@ -16133,13 +16771,6 @@
   <p:transition spd="med">
     <p:fade/>
   </p:transition>
-  <p:timing>
-    <p:tnLst>
-      <p:par>
-        <p:cTn id="1" dur="indefinite" restart="never" nodeType="tmRoot"/>
-      </p:par>
-    </p:tnLst>
-  </p:timing>
 </p:sld>
 </file>
 
@@ -16281,37 +16912,12 @@
               <a:buChar char="•"/>
             </a:pPr>
             <a:r>
-              <a:rPr lang="en-US" sz="2400" dirty="0" smtClean="0"/>
-              <a:t>Investigation </a:t>
+              <a:rPr lang="en-US" sz="2400" dirty="0"/>
+              <a:t>Investigation of Mongo DB </a:t>
             </a:r>
-            <a:r>
-              <a:rPr lang="en-US" sz="2400" dirty="0"/>
-              <a:t>of Mongo DB </a:t>
-            </a:r>
-            <a:endParaRPr lang="en-US" sz="2400" dirty="0" smtClean="0"/>
           </a:p>
           <a:p>
             <a:pPr marL="457200" lvl="0" indent="-431800">
-              <a:lnSpc>
-                <a:spcPct val="90000"/>
-              </a:lnSpc>
-              <a:spcBef>
-                <a:spcPts val="1000"/>
-              </a:spcBef>
-              <a:buClr>
-                <a:schemeClr val="dk1"/>
-              </a:buClr>
-              <a:buSzPct val="100000"/>
-              <a:buFont typeface="Arial"/>
-              <a:buChar char="•"/>
-            </a:pPr>
-            <a:r>
-              <a:rPr lang="en-US" sz="2400" dirty="0" smtClean="0"/>
-              <a:t>Research angular 4</a:t>
-            </a:r>
-          </a:p>
-          <a:p>
-            <a:pPr marL="457200" indent="-431800">
               <a:lnSpc>
                 <a:spcPct val="90000"/>
               </a:lnSpc>
@@ -16327,15 +16933,11 @@
             </a:pPr>
             <a:r>
               <a:rPr lang="en-US" sz="2400" dirty="0"/>
-              <a:t>Start of product management </a:t>
+              <a:t>Research angular 4</a:t>
             </a:r>
-            <a:r>
-              <a:rPr lang="en-US" sz="2400" dirty="0" smtClean="0"/>
-              <a:t>module</a:t>
-            </a:r>
-          </a:p>
-          <a:p>
-            <a:pPr marL="457200" lvl="0" indent="-431800">
+          </a:p>
+          <a:p>
+            <a:pPr marL="457200" indent="-431800">
               <a:lnSpc>
                 <a:spcPct val="90000"/>
               </a:lnSpc>
@@ -16350,16 +16952,28 @@
               <a:buChar char="•"/>
             </a:pPr>
             <a:r>
-              <a:rPr lang="en-US" sz="2400" dirty="0" smtClean="0"/>
-              <a:t>Creation </a:t>
+              <a:rPr lang="en-US" sz="2400" dirty="0"/>
+              <a:t>Start of product management module</a:t>
             </a:r>
+          </a:p>
+          <a:p>
+            <a:pPr marL="457200" lvl="0" indent="-431800">
+              <a:lnSpc>
+                <a:spcPct val="90000"/>
+              </a:lnSpc>
+              <a:spcBef>
+                <a:spcPts val="1000"/>
+              </a:spcBef>
+              <a:buClr>
+                <a:schemeClr val="dk1"/>
+              </a:buClr>
+              <a:buSzPct val="100000"/>
+              <a:buFont typeface="Arial"/>
+              <a:buChar char="•"/>
+            </a:pPr>
             <a:r>
               <a:rPr lang="en-US" sz="2400" dirty="0"/>
-              <a:t>of GUID Provider to generate global </a:t>
-            </a:r>
-            <a:r>
-              <a:rPr lang="en-US" sz="2400" dirty="0" smtClean="0"/>
-              <a:t>IDs securely</a:t>
+              <a:t>Creation of GUID Provider to generate global IDs securely</a:t>
             </a:r>
           </a:p>
           <a:p>
@@ -16383,48 +16997,20 @@
                   <a:schemeClr val="tx1"/>
                 </a:solidFill>
               </a:rPr>
-              <a:t>Research </a:t>
+              <a:t>Research how to </a:t>
             </a:r>
             <a:r>
-              <a:rPr lang="en-US" sz="2400" dirty="0" smtClean="0">
+              <a:rPr lang="en-US" sz="2400" dirty="0">
                 <a:solidFill>
                   <a:schemeClr val="tx1"/>
                 </a:solidFill>
+                <a:latin typeface="Arial" panose="020B0604020202020204" pitchFamily="34" charset="0"/>
+                <a:sym typeface="Calibri"/>
               </a:rPr>
-              <a:t>how to </a:t>
+              <a:t>code coverage on </a:t>
             </a:r>
             <a:r>
-              <a:rPr lang="en-US" sz="2400" dirty="0" smtClean="0">
-                <a:solidFill>
-                  <a:schemeClr val="tx1"/>
-                </a:solidFill>
-                <a:latin typeface="Arial" panose="020B0604020202020204" pitchFamily="34" charset="0"/>
-                <a:sym typeface="Calibri"/>
-              </a:rPr>
-              <a:t>code coverage </a:t>
-            </a:r>
-            <a:r>
-              <a:rPr lang="en-US" sz="2400" dirty="0" smtClean="0">
-                <a:solidFill>
-                  <a:schemeClr val="tx1"/>
-                </a:solidFill>
-                <a:latin typeface="Arial" panose="020B0604020202020204" pitchFamily="34" charset="0"/>
-                <a:sym typeface="Calibri"/>
-              </a:rPr>
-              <a:t>on</a:t>
-            </a:r>
-            <a:r>
-              <a:rPr lang="en-US" sz="2400" dirty="0" smtClean="0">
-                <a:solidFill>
-                  <a:schemeClr val="tx1"/>
-                </a:solidFill>
-                <a:latin typeface="Arial" panose="020B0604020202020204" pitchFamily="34" charset="0"/>
-                <a:sym typeface="Calibri"/>
-              </a:rPr>
-              <a:t> </a:t>
-            </a:r>
-            <a:r>
-              <a:rPr lang="en-US" sz="2400" dirty="0" err="1" smtClean="0">
+              <a:rPr lang="en-US" sz="2400" dirty="0" err="1">
                 <a:solidFill>
                   <a:schemeClr val="tx1"/>
                 </a:solidFill>
@@ -16517,7 +17103,7 @@
               <a:t>Committed functionalities: </a:t>
             </a:r>
             <a:r>
-              <a:rPr lang="en-US" sz="2400" dirty="0" smtClean="0">
+              <a:rPr lang="en-US" sz="2400" dirty="0">
                 <a:solidFill>
                   <a:srgbClr val="00B050"/>
                 </a:solidFill>
@@ -16526,19 +17112,7 @@
                 <a:cs typeface="Calibri"/>
                 <a:sym typeface="Calibri"/>
               </a:rPr>
-              <a:t>35</a:t>
-            </a:r>
-            <a:r>
-              <a:rPr lang="en-US" sz="2400" dirty="0" smtClean="0">
-                <a:solidFill>
-                  <a:srgbClr val="00B050"/>
-                </a:solidFill>
-                <a:latin typeface="Calibri"/>
-                <a:ea typeface="Calibri"/>
-                <a:cs typeface="Calibri"/>
-                <a:sym typeface="Calibri"/>
-              </a:rPr>
-              <a:t> </a:t>
+              <a:t>35 </a:t>
             </a:r>
             <a:r>
               <a:rPr lang="en-US" sz="2400" b="0" i="0" u="none" strike="noStrike" cap="none" dirty="0">
@@ -16550,31 +17124,7 @@
                 <a:cs typeface="Calibri"/>
                 <a:sym typeface="Calibri"/>
               </a:rPr>
-              <a:t>US, </a:t>
-            </a:r>
-            <a:r>
-              <a:rPr lang="en-US" sz="2400" b="0" i="0" u="none" strike="noStrike" cap="none" dirty="0" smtClean="0">
-                <a:solidFill>
-                  <a:srgbClr val="00B050"/>
-                </a:solidFill>
-                <a:latin typeface="Calibri"/>
-                <a:ea typeface="Calibri"/>
-                <a:cs typeface="Calibri"/>
-                <a:sym typeface="Calibri"/>
-              </a:rPr>
-              <a:t>4 </a:t>
-            </a:r>
-            <a:r>
-              <a:rPr lang="en-US" sz="2400" b="0" i="0" u="none" strike="noStrike" cap="none" dirty="0">
-                <a:solidFill>
-                  <a:srgbClr val="00B050"/>
-                </a:solidFill>
-                <a:latin typeface="Calibri"/>
-                <a:ea typeface="Calibri"/>
-                <a:cs typeface="Calibri"/>
-                <a:sym typeface="Calibri"/>
-              </a:rPr>
-              <a:t>Non-US</a:t>
+              <a:t>US, 4 Non-US</a:t>
             </a:r>
           </a:p>
           <a:p>
@@ -16605,22 +17155,10 @@
                 <a:cs typeface="Calibri"/>
                 <a:sym typeface="Calibri"/>
               </a:rPr>
-              <a:t>Committed Story Points</a:t>
+              <a:t>Committed Story Points: </a:t>
             </a:r>
             <a:r>
-              <a:rPr lang="en-US" sz="2400" dirty="0" smtClean="0">
-                <a:solidFill>
-                  <a:schemeClr val="tx1"/>
-                </a:solidFill>
-                <a:latin typeface="Calibri"/>
-                <a:ea typeface="Calibri"/>
-                <a:cs typeface="Calibri"/>
-                <a:sym typeface="Calibri"/>
-              </a:rPr>
-              <a:t>: </a:t>
-            </a:r>
-            <a:r>
-              <a:rPr lang="en-US" sz="2400" dirty="0" smtClean="0">
+              <a:rPr lang="en-US" sz="2400" dirty="0">
                 <a:solidFill>
                   <a:srgbClr val="00B050"/>
                 </a:solidFill>
@@ -16681,7 +17219,7 @@
               <a:t> </a:t>
             </a:r>
             <a:r>
-              <a:rPr lang="en-US" sz="2400" dirty="0" smtClean="0">
+              <a:rPr lang="en-US" sz="2400" dirty="0">
                 <a:solidFill>
                   <a:srgbClr val="FF0000"/>
                 </a:solidFill>
@@ -16690,55 +17228,19 @@
                 <a:cs typeface="Calibri"/>
                 <a:sym typeface="Calibri"/>
               </a:rPr>
-              <a:t>-2 </a:t>
+              <a:t>-2 US</a:t>
             </a:r>
             <a:r>
               <a:rPr lang="en-US" sz="2400" dirty="0">
                 <a:solidFill>
-                  <a:srgbClr val="FF0000"/>
+                  <a:srgbClr val="00B050"/>
                 </a:solidFill>
                 <a:latin typeface="Calibri"/>
                 <a:ea typeface="Calibri"/>
                 <a:cs typeface="Calibri"/>
                 <a:sym typeface="Calibri"/>
               </a:rPr>
-              <a:t>US</a:t>
-            </a:r>
-            <a:r>
-              <a:rPr lang="en-US" sz="2400" dirty="0">
-                <a:solidFill>
-                  <a:srgbClr val="00B050"/>
-                </a:solidFill>
-                <a:latin typeface="Calibri"/>
-                <a:ea typeface="Calibri"/>
-                <a:cs typeface="Calibri"/>
-                <a:sym typeface="Calibri"/>
-              </a:rPr>
-              <a:t>, </a:t>
-            </a:r>
-            <a:r>
-              <a:rPr lang="en-US" sz="2400" dirty="0" smtClean="0">
-                <a:solidFill>
-                  <a:srgbClr val="00B050"/>
-                </a:solidFill>
-                <a:latin typeface="Calibri"/>
-                <a:ea typeface="Calibri"/>
-                <a:cs typeface="Calibri"/>
-                <a:sym typeface="Calibri"/>
-              </a:rPr>
-              <a:t>7 </a:t>
-            </a:r>
-            <a:r>
-              <a:rPr lang="en-US" sz="2400" dirty="0">
-                <a:solidFill>
-                  <a:srgbClr val="00B050"/>
-                </a:solidFill>
-                <a:latin typeface="Calibri"/>
-                <a:ea typeface="Calibri"/>
-                <a:cs typeface="Calibri"/>
-                <a:sym typeface="Calibri"/>
-              </a:rPr>
-              <a:t>Non-US</a:t>
+              <a:t>, 7 Non-US</a:t>
             </a:r>
           </a:p>
           <a:p>
@@ -16815,7 +17317,7 @@
               <a:t>Story points completed: </a:t>
             </a:r>
             <a:r>
-              <a:rPr lang="en-US" sz="2400" dirty="0" smtClean="0">
+              <a:rPr lang="en-US" sz="2400" dirty="0">
                 <a:solidFill>
                   <a:srgbClr val="00B050"/>
                 </a:solidFill>
@@ -16827,7 +17329,7 @@
               <a:t>66</a:t>
             </a:r>
             <a:r>
-              <a:rPr lang="en-US" sz="2400" b="0" i="0" u="none" strike="noStrike" cap="none" dirty="0" smtClean="0">
+              <a:rPr lang="en-US" sz="2400" b="0" i="0" u="none" strike="noStrike" cap="none" dirty="0">
                 <a:solidFill>
                   <a:srgbClr val="00B050"/>
                 </a:solidFill>
@@ -16836,19 +17338,7 @@
                 <a:cs typeface="Calibri"/>
                 <a:sym typeface="Calibri"/>
               </a:rPr>
-              <a:t> </a:t>
-            </a:r>
-            <a:r>
-              <a:rPr lang="en-US" sz="2400" b="0" i="0" u="none" strike="noStrike" cap="none" dirty="0">
-                <a:solidFill>
-                  <a:srgbClr val="00B050"/>
-                </a:solidFill>
-                <a:latin typeface="Calibri"/>
-                <a:ea typeface="Calibri"/>
-                <a:cs typeface="Calibri"/>
-                <a:sym typeface="Calibri"/>
-              </a:rPr>
-              <a:t>points</a:t>
+              <a:t> points</a:t>
             </a:r>
           </a:p>
           <a:p>
@@ -16879,7 +17369,7 @@
               <a:t>Completed: </a:t>
             </a:r>
             <a:r>
-              <a:rPr lang="en-US" sz="2400" dirty="0" smtClean="0">
+              <a:rPr lang="en-US" sz="2400" dirty="0">
                 <a:solidFill>
                   <a:srgbClr val="00B050"/>
                 </a:solidFill>
@@ -16888,10 +17378,10 @@
                 <a:cs typeface="Calibri"/>
                 <a:sym typeface="Calibri"/>
               </a:rPr>
-              <a:t>66</a:t>
+              <a:t>32</a:t>
             </a:r>
             <a:r>
-              <a:rPr lang="en-US" sz="2400" b="0" i="0" u="none" strike="noStrike" cap="none" dirty="0" smtClean="0">
+              <a:rPr lang="en-US" sz="2400" b="0" i="0" u="none" strike="noStrike" cap="none" dirty="0">
                 <a:solidFill>
                   <a:srgbClr val="00B050"/>
                 </a:solidFill>
@@ -16912,7 +17402,7 @@
                 <a:cs typeface="Calibri"/>
                 <a:sym typeface="Calibri"/>
               </a:rPr>
-              <a:t>US, 13 Non-US</a:t>
+              <a:t>US, 11 Non-US</a:t>
             </a:r>
           </a:p>
           <a:p>
@@ -16970,7 +17460,7 @@
               <a:t>0</a:t>
             </a:r>
             <a:r>
-              <a:rPr lang="en-US" sz="2400" dirty="0" smtClean="0">
+              <a:rPr lang="en-US" sz="2400" dirty="0">
                 <a:solidFill>
                   <a:srgbClr val="00B050"/>
                 </a:solidFill>
@@ -16980,14 +17470,6 @@
               </a:rPr>
               <a:t> US</a:t>
             </a:r>
-            <a:endParaRPr lang="en-US" sz="2400" dirty="0">
-              <a:solidFill>
-                <a:srgbClr val="00B050"/>
-              </a:solidFill>
-              <a:latin typeface="Calibri"/>
-              <a:cs typeface="Calibri"/>
-              <a:sym typeface="Calibri"/>
-            </a:endParaRPr>
           </a:p>
           <a:p>
             <a:pPr marL="342900" marR="0" lvl="0" indent="-342900" algn="l" rtl="0">
@@ -17032,7 +17514,7 @@
               <a:t>0</a:t>
             </a:r>
             <a:r>
-              <a:rPr lang="en-US" sz="2400" dirty="0" smtClean="0">
+              <a:rPr lang="en-US" sz="2400" dirty="0">
                 <a:solidFill>
                   <a:srgbClr val="00B050"/>
                 </a:solidFill>
@@ -17040,18 +17522,7 @@
                 <a:cs typeface="Calibri"/>
                 <a:sym typeface="Calibri"/>
               </a:rPr>
-              <a:t> </a:t>
-            </a:r>
-            <a:r>
-              <a:rPr lang="en-US" sz="2400" dirty="0">
-                <a:solidFill>
-                  <a:srgbClr val="00B050"/>
-                </a:solidFill>
-                <a:latin typeface="Calibri"/>
-                <a:cs typeface="Calibri"/>
-                <a:sym typeface="Calibri"/>
-              </a:rPr>
-              <a:t>points</a:t>
+              <a:t> points</a:t>
             </a:r>
           </a:p>
           <a:p>
@@ -17122,31 +17593,7 @@
                 <a:cs typeface="Calibri"/>
                 <a:sym typeface="Calibri"/>
               </a:rPr>
-              <a:t>Sprint </a:t>
-            </a:r>
-            <a:r>
-              <a:rPr lang="en-US" sz="3200" b="1" i="0" u="none" strike="noStrike" cap="none" dirty="0" smtClean="0">
-                <a:solidFill>
-                  <a:schemeClr val="dk1"/>
-                </a:solidFill>
-                <a:latin typeface="Calibri"/>
-                <a:ea typeface="Calibri"/>
-                <a:cs typeface="Calibri"/>
-                <a:sym typeface="Calibri"/>
-              </a:rPr>
-              <a:t>25  </a:t>
-            </a:r>
-            <a:r>
-              <a:rPr lang="en-US" sz="3200" b="1" i="0" u="none" strike="noStrike" cap="none" dirty="0">
-                <a:solidFill>
-                  <a:schemeClr val="dk1"/>
-                </a:solidFill>
-                <a:latin typeface="Calibri"/>
-                <a:ea typeface="Calibri"/>
-                <a:cs typeface="Calibri"/>
-                <a:sym typeface="Calibri"/>
-              </a:rPr>
-              <a:t>Goals</a:t>
+              <a:t>Sprint 25  Goals</a:t>
             </a:r>
           </a:p>
         </p:txBody>
@@ -17184,7 +17631,7 @@
               <a:buNone/>
             </a:pPr>
             <a:r>
-              <a:rPr lang="en-US" sz="3200" b="1">
+              <a:rPr lang="en-US" sz="3200" b="1" dirty="0">
                 <a:solidFill>
                   <a:schemeClr val="dk1"/>
                 </a:solidFill>
@@ -17250,13 +17697,6 @@
   <p:transition spd="med">
     <p:fade/>
   </p:transition>
-  <p:timing>
-    <p:tnLst>
-      <p:par>
-        <p:cTn id="1" dur="indefinite" restart="never" nodeType="tmRoot"/>
-      </p:par>
-    </p:tnLst>
-  </p:timing>
 </p:sld>
 </file>
 
@@ -17428,19 +17868,7 @@
               <a:rPr lang="en-US" dirty="0">
                 <a:hlinkClick r:id="rId4"/>
               </a:rPr>
-              <a:t>Sprint </a:t>
-            </a:r>
-            <a:r>
-              <a:rPr lang="en-US" dirty="0" smtClean="0">
-                <a:hlinkClick r:id="rId4"/>
-              </a:rPr>
-              <a:t>25 </a:t>
-            </a:r>
-            <a:r>
-              <a:rPr lang="en-US" dirty="0">
-                <a:hlinkClick r:id="rId4"/>
-              </a:rPr>
-              <a:t>Linked</a:t>
+              <a:t>Sprint 25 Linked</a:t>
             </a:r>
             <a:endParaRPr lang="th-TH" dirty="0"/>
           </a:p>
@@ -17454,13 +17882,6 @@
   <p:transition spd="med">
     <p:fade/>
   </p:transition>
-  <p:timing>
-    <p:tnLst>
-      <p:par>
-        <p:cTn id="1" dur="indefinite" restart="never" nodeType="tmRoot"/>
-      </p:par>
-    </p:tnLst>
-  </p:timing>
 </p:sld>
 </file>
 
@@ -17521,7 +17942,7 @@
               <a:buNone/>
             </a:pPr>
             <a:r>
-              <a:rPr lang="en-US" sz="3600" b="1" u="sng">
+              <a:rPr lang="en-US" sz="3600" b="1" u="sng" dirty="0">
                 <a:solidFill>
                   <a:schemeClr val="dk1"/>
                 </a:solidFill>
@@ -17599,12 +18020,20 @@
               <a:buChar char="●"/>
             </a:pPr>
             <a:r>
-              <a:rPr lang="en-US" sz="2800" dirty="0" smtClean="0">
+              <a:rPr lang="en-US" sz="2800" dirty="0">
                 <a:latin typeface="+mj-lt"/>
                 <a:ea typeface="Calibri"/>
                 <a:cs typeface="Calibri"/>
               </a:rPr>
-              <a:t>Lack </a:t>
+              <a:t>Lack of experience</a:t>
+            </a:r>
+            <a:r>
+              <a:rPr lang="th-TH" sz="2800" dirty="0">
+                <a:latin typeface="+mj-lt"/>
+                <a:ea typeface="Calibri"/>
+                <a:cs typeface="Calibri"/>
+              </a:rPr>
+              <a:t> </a:t>
             </a:r>
             <a:r>
               <a:rPr lang="en-US" sz="2800" dirty="0">
@@ -17612,37 +18041,8 @@
                 <a:ea typeface="Calibri"/>
                 <a:cs typeface="Calibri"/>
               </a:rPr>
-              <a:t>of </a:t>
+              <a:t>on front-end</a:t>
             </a:r>
-            <a:r>
-              <a:rPr lang="en-US" sz="2800" dirty="0" smtClean="0">
-                <a:latin typeface="+mj-lt"/>
-                <a:ea typeface="Calibri"/>
-                <a:cs typeface="Calibri"/>
-              </a:rPr>
-              <a:t>experience</a:t>
-            </a:r>
-            <a:r>
-              <a:rPr lang="th-TH" sz="2800" dirty="0" smtClean="0">
-                <a:latin typeface="+mj-lt"/>
-                <a:ea typeface="Calibri"/>
-                <a:cs typeface="Calibri"/>
-              </a:rPr>
-              <a:t> </a:t>
-            </a:r>
-            <a:r>
-              <a:rPr lang="en-US" sz="2800" dirty="0" smtClean="0">
-                <a:latin typeface="+mj-lt"/>
-                <a:ea typeface="Calibri"/>
-                <a:cs typeface="Calibri"/>
-              </a:rPr>
-              <a:t>on front-end that make working slow</a:t>
-            </a:r>
-            <a:endParaRPr lang="th-TH" sz="2800" dirty="0" smtClean="0">
-              <a:latin typeface="+mj-lt"/>
-              <a:ea typeface="Calibri"/>
-              <a:cs typeface="Calibri"/>
-            </a:endParaRPr>
           </a:p>
           <a:p>
             <a:pPr marL="457200" lvl="0" indent="-381000">
@@ -17657,7 +18057,7 @@
               <a:buChar char="●"/>
             </a:pPr>
             <a:r>
-              <a:rPr lang="en-US" sz="2800" dirty="0" smtClean="0">
+              <a:rPr lang="en-US" sz="2800" dirty="0">
                 <a:solidFill>
                   <a:schemeClr val="dk1"/>
                 </a:solidFill>
@@ -17666,7 +18066,7 @@
                 <a:cs typeface="Calibri"/>
                 <a:sym typeface="Calibri"/>
               </a:rPr>
-              <a:t>Wrong estimated time</a:t>
+              <a:t>Estimated time was wrong</a:t>
             </a:r>
           </a:p>
           <a:p>
@@ -17682,7 +18082,7 @@
               <a:buChar char="●"/>
             </a:pPr>
             <a:r>
-              <a:rPr lang="en-US" sz="2800" dirty="0" smtClean="0">
+              <a:rPr lang="en-US" sz="2800" dirty="0">
                 <a:solidFill>
                   <a:schemeClr val="dk1"/>
                 </a:solidFill>
@@ -17706,7 +18106,7 @@
               <a:buFont typeface="Calibri"/>
               <a:buChar char="●"/>
             </a:pPr>
-            <a:endParaRPr lang="en-US" sz="1800" dirty="0" smtClean="0">
+            <a:endParaRPr lang="en-US" sz="1800" dirty="0">
               <a:solidFill>
                 <a:schemeClr val="dk1"/>
               </a:solidFill>
@@ -17728,7 +18128,7 @@
               <a:buFont typeface="Calibri"/>
               <a:buChar char="●"/>
             </a:pPr>
-            <a:endParaRPr lang="en-US" sz="1800" dirty="0" smtClean="0">
+            <a:endParaRPr lang="en-US" sz="1800" dirty="0">
               <a:solidFill>
                 <a:schemeClr val="dk1"/>
               </a:solidFill>
@@ -17750,7 +18150,7 @@
               <a:buFont typeface="Calibri"/>
               <a:buChar char="●"/>
             </a:pPr>
-            <a:endParaRPr lang="en-US" sz="1800" dirty="0" smtClean="0">
+            <a:endParaRPr lang="en-US" sz="1800" dirty="0">
               <a:solidFill>
                 <a:schemeClr val="dk1"/>
               </a:solidFill>
@@ -17950,13 +18350,6 @@
   <p:transition spd="med">
     <p:fade/>
   </p:transition>
-  <p:timing>
-    <p:tnLst>
-      <p:par>
-        <p:cTn id="1" dur="indefinite" restart="never" nodeType="tmRoot"/>
-      </p:par>
-    </p:tnLst>
-  </p:timing>
 </p:sld>
 </file>
 
@@ -18110,13 +18503,6 @@
   <p:transition spd="med">
     <p:fade/>
   </p:transition>
-  <p:timing>
-    <p:tnLst>
-      <p:par>
-        <p:cTn id="1" dur="indefinite" restart="never" nodeType="tmRoot"/>
-      </p:par>
-    </p:tnLst>
-  </p:timing>
 </p:sld>
 </file>
 
@@ -18265,65 +18651,8 @@
                 <a:cs typeface="Calibri"/>
                 <a:sym typeface="Calibri"/>
               </a:rPr>
-              <a:t>Target velocity: </a:t>
+              <a:t>Target velocity: 65 	Achieved velocity: 66</a:t>
             </a:r>
-            <a:r>
-              <a:rPr lang="en-US" sz="2000" dirty="0" smtClean="0">
-                <a:solidFill>
-                  <a:schemeClr val="dk1"/>
-                </a:solidFill>
-                <a:latin typeface="Calibri"/>
-                <a:ea typeface="Calibri"/>
-                <a:cs typeface="Calibri"/>
-                <a:sym typeface="Calibri"/>
-              </a:rPr>
-              <a:t>65</a:t>
-            </a:r>
-            <a:r>
-              <a:rPr lang="en-US" sz="2000" dirty="0" smtClean="0">
-                <a:solidFill>
-                  <a:schemeClr val="dk1"/>
-                </a:solidFill>
-                <a:latin typeface="Calibri"/>
-                <a:ea typeface="Calibri"/>
-                <a:cs typeface="Calibri"/>
-                <a:sym typeface="Calibri"/>
-              </a:rPr>
-              <a:t> </a:t>
-            </a:r>
-            <a:r>
-              <a:rPr lang="en-US" sz="2000" dirty="0">
-                <a:solidFill>
-                  <a:schemeClr val="dk1"/>
-                </a:solidFill>
-                <a:latin typeface="Calibri"/>
-                <a:ea typeface="Calibri"/>
-                <a:cs typeface="Calibri"/>
-                <a:sym typeface="Calibri"/>
-              </a:rPr>
-              <a:t>	Achieved velocity: </a:t>
-            </a:r>
-            <a:r>
-              <a:rPr lang="en-US" sz="2000" dirty="0" smtClean="0">
-                <a:solidFill>
-                  <a:schemeClr val="dk1"/>
-                </a:solidFill>
-                <a:latin typeface="Calibri"/>
-                <a:ea typeface="Calibri"/>
-                <a:cs typeface="Calibri"/>
-                <a:sym typeface="Calibri"/>
-              </a:rPr>
-              <a:t>66</a:t>
-            </a:r>
-            <a:endParaRPr lang="en-US" sz="2000" dirty="0">
-              <a:solidFill>
-                <a:schemeClr val="dk1"/>
-              </a:solidFill>
-              <a:latin typeface="Calibri"/>
-              <a:ea typeface="Calibri"/>
-              <a:cs typeface="Calibri"/>
-              <a:sym typeface="Calibri"/>
-            </a:endParaRPr>
           </a:p>
           <a:p>
             <a:pPr marL="0" marR="0" lvl="0" indent="0" algn="l" rtl="0">
@@ -18454,13 +18783,6 @@
   <p:transition spd="med">
     <p:fade/>
   </p:transition>
-  <p:timing>
-    <p:tnLst>
-      <p:par>
-        <p:cTn id="1" dur="indefinite" restart="never" nodeType="tmRoot"/>
-      </p:par>
-    </p:tnLst>
-  </p:timing>
 </p:sld>
 </file>
 
@@ -18638,13 +18960,6 @@
   <p:transition spd="med">
     <p:fade/>
   </p:transition>
-  <p:timing>
-    <p:tnLst>
-      <p:par>
-        <p:cTn id="1" dur="indefinite" restart="never" nodeType="tmRoot"/>
-      </p:par>
-    </p:tnLst>
-  </p:timing>
 </p:sld>
 </file>
 

</xml_diff>